<commit_message>
Update UG & DG
</commit_message>
<xml_diff>
--- a/docs/diagrams/ModelComponentClassBetterOopDiagram.pptx
+++ b/docs/diagrams/ModelComponentClassBetterOopDiagram.pptx
@@ -175,7 +175,7 @@
             </a:lvl1pPr>
           </a:lstStyle>
           <a:p>
-            <a:endParaRPr lang="en-US"/>
+            <a:endParaRPr lang="en-US" dirty="0"/>
           </a:p>
         </p:txBody>
       </p:sp>
@@ -208,9 +208,9 @@
           <a:p>
             <a:fld id="{F5CC4B3F-88C1-4FFA-B1B6-F41C21DC6924}" type="datetimeFigureOut">
               <a:rPr lang="en-US" smtClean="0"/>
-              <a:t>12/5/2018</a:t>
+              <a:t>4/14/2019</a:t>
             </a:fld>
-            <a:endParaRPr lang="en-US"/>
+            <a:endParaRPr lang="en-US" dirty="0"/>
           </a:p>
         </p:txBody>
       </p:sp>
@@ -243,7 +243,7 @@
           <a:bodyPr vert="horz" lIns="91440" tIns="45720" rIns="91440" bIns="45720" rtlCol="0" anchor="ctr"/>
           <a:lstStyle/>
           <a:p>
-            <a:endParaRPr lang="en-US"/>
+            <a:endParaRPr lang="en-US" dirty="0"/>
           </a:p>
         </p:txBody>
       </p:sp>
@@ -333,7 +333,7 @@
             </a:lvl1pPr>
           </a:lstStyle>
           <a:p>
-            <a:endParaRPr lang="en-US"/>
+            <a:endParaRPr lang="en-US" dirty="0"/>
           </a:p>
         </p:txBody>
       </p:sp>
@@ -368,7 +368,7 @@
               <a:rPr lang="en-US" smtClean="0"/>
               <a:t>‹#›</a:t>
             </a:fld>
-            <a:endParaRPr lang="en-US"/>
+            <a:endParaRPr lang="en-US" dirty="0"/>
           </a:p>
         </p:txBody>
       </p:sp>
@@ -654,9 +654,9 @@
           <a:p>
             <a:fld id="{78C97017-6FC3-485B-9764-EAC9E56C1D49}" type="datetimeFigureOut">
               <a:rPr lang="en-US" smtClean="0"/>
-              <a:t>12/5/2018</a:t>
+              <a:t>4/14/2019</a:t>
             </a:fld>
-            <a:endParaRPr lang="en-US"/>
+            <a:endParaRPr lang="en-US" dirty="0"/>
           </a:p>
         </p:txBody>
       </p:sp>
@@ -675,7 +675,7 @@
           <a:bodyPr/>
           <a:lstStyle/>
           <a:p>
-            <a:endParaRPr lang="en-US"/>
+            <a:endParaRPr lang="en-US" dirty="0"/>
           </a:p>
         </p:txBody>
       </p:sp>
@@ -698,7 +698,7 @@
               <a:rPr lang="en-US" smtClean="0"/>
               <a:t>‹#›</a:t>
             </a:fld>
-            <a:endParaRPr lang="en-US"/>
+            <a:endParaRPr lang="en-US" dirty="0"/>
           </a:p>
         </p:txBody>
       </p:sp>
@@ -822,9 +822,9 @@
           <a:p>
             <a:fld id="{78C97017-6FC3-485B-9764-EAC9E56C1D49}" type="datetimeFigureOut">
               <a:rPr lang="en-US" smtClean="0"/>
-              <a:t>12/5/2018</a:t>
+              <a:t>4/14/2019</a:t>
             </a:fld>
-            <a:endParaRPr lang="en-US"/>
+            <a:endParaRPr lang="en-US" dirty="0"/>
           </a:p>
         </p:txBody>
       </p:sp>
@@ -843,7 +843,7 @@
           <a:bodyPr/>
           <a:lstStyle/>
           <a:p>
-            <a:endParaRPr lang="en-US"/>
+            <a:endParaRPr lang="en-US" dirty="0"/>
           </a:p>
         </p:txBody>
       </p:sp>
@@ -866,7 +866,7 @@
               <a:rPr lang="en-US" smtClean="0"/>
               <a:t>‹#›</a:t>
             </a:fld>
-            <a:endParaRPr lang="en-US"/>
+            <a:endParaRPr lang="en-US" dirty="0"/>
           </a:p>
         </p:txBody>
       </p:sp>
@@ -1000,9 +1000,9 @@
           <a:p>
             <a:fld id="{78C97017-6FC3-485B-9764-EAC9E56C1D49}" type="datetimeFigureOut">
               <a:rPr lang="en-US" smtClean="0"/>
-              <a:t>12/5/2018</a:t>
+              <a:t>4/14/2019</a:t>
             </a:fld>
-            <a:endParaRPr lang="en-US"/>
+            <a:endParaRPr lang="en-US" dirty="0"/>
           </a:p>
         </p:txBody>
       </p:sp>
@@ -1021,7 +1021,7 @@
           <a:bodyPr/>
           <a:lstStyle/>
           <a:p>
-            <a:endParaRPr lang="en-US"/>
+            <a:endParaRPr lang="en-US" dirty="0"/>
           </a:p>
         </p:txBody>
       </p:sp>
@@ -1044,7 +1044,7 @@
               <a:rPr lang="en-US" smtClean="0"/>
               <a:t>‹#›</a:t>
             </a:fld>
-            <a:endParaRPr lang="en-US"/>
+            <a:endParaRPr lang="en-US" dirty="0"/>
           </a:p>
         </p:txBody>
       </p:sp>
@@ -1168,9 +1168,9 @@
           <a:p>
             <a:fld id="{78C97017-6FC3-485B-9764-EAC9E56C1D49}" type="datetimeFigureOut">
               <a:rPr lang="en-US" smtClean="0"/>
-              <a:t>12/5/2018</a:t>
+              <a:t>4/14/2019</a:t>
             </a:fld>
-            <a:endParaRPr lang="en-US"/>
+            <a:endParaRPr lang="en-US" dirty="0"/>
           </a:p>
         </p:txBody>
       </p:sp>
@@ -1189,7 +1189,7 @@
           <a:bodyPr/>
           <a:lstStyle/>
           <a:p>
-            <a:endParaRPr lang="en-US"/>
+            <a:endParaRPr lang="en-US" dirty="0"/>
           </a:p>
         </p:txBody>
       </p:sp>
@@ -1212,7 +1212,7 @@
               <a:rPr lang="en-US" smtClean="0"/>
               <a:t>‹#›</a:t>
             </a:fld>
-            <a:endParaRPr lang="en-US"/>
+            <a:endParaRPr lang="en-US" dirty="0"/>
           </a:p>
         </p:txBody>
       </p:sp>
@@ -1413,9 +1413,9 @@
           <a:p>
             <a:fld id="{78C97017-6FC3-485B-9764-EAC9E56C1D49}" type="datetimeFigureOut">
               <a:rPr lang="en-US" smtClean="0"/>
-              <a:t>12/5/2018</a:t>
+              <a:t>4/14/2019</a:t>
             </a:fld>
-            <a:endParaRPr lang="en-US"/>
+            <a:endParaRPr lang="en-US" dirty="0"/>
           </a:p>
         </p:txBody>
       </p:sp>
@@ -1434,7 +1434,7 @@
           <a:bodyPr/>
           <a:lstStyle/>
           <a:p>
-            <a:endParaRPr lang="en-US"/>
+            <a:endParaRPr lang="en-US" dirty="0"/>
           </a:p>
         </p:txBody>
       </p:sp>
@@ -1457,7 +1457,7 @@
               <a:rPr lang="en-US" smtClean="0"/>
               <a:t>‹#›</a:t>
             </a:fld>
-            <a:endParaRPr lang="en-US"/>
+            <a:endParaRPr lang="en-US" dirty="0"/>
           </a:p>
         </p:txBody>
       </p:sp>
@@ -1698,9 +1698,9 @@
           <a:p>
             <a:fld id="{78C97017-6FC3-485B-9764-EAC9E56C1D49}" type="datetimeFigureOut">
               <a:rPr lang="en-US" smtClean="0"/>
-              <a:t>12/5/2018</a:t>
+              <a:t>4/14/2019</a:t>
             </a:fld>
-            <a:endParaRPr lang="en-US"/>
+            <a:endParaRPr lang="en-US" dirty="0"/>
           </a:p>
         </p:txBody>
       </p:sp>
@@ -1719,7 +1719,7 @@
           <a:bodyPr/>
           <a:lstStyle/>
           <a:p>
-            <a:endParaRPr lang="en-US"/>
+            <a:endParaRPr lang="en-US" dirty="0"/>
           </a:p>
         </p:txBody>
       </p:sp>
@@ -1742,7 +1742,7 @@
               <a:rPr lang="en-US" smtClean="0"/>
               <a:t>‹#›</a:t>
             </a:fld>
-            <a:endParaRPr lang="en-US"/>
+            <a:endParaRPr lang="en-US" dirty="0"/>
           </a:p>
         </p:txBody>
       </p:sp>
@@ -2117,9 +2117,9 @@
           <a:p>
             <a:fld id="{78C97017-6FC3-485B-9764-EAC9E56C1D49}" type="datetimeFigureOut">
               <a:rPr lang="en-US" smtClean="0"/>
-              <a:t>12/5/2018</a:t>
+              <a:t>4/14/2019</a:t>
             </a:fld>
-            <a:endParaRPr lang="en-US"/>
+            <a:endParaRPr lang="en-US" dirty="0"/>
           </a:p>
         </p:txBody>
       </p:sp>
@@ -2138,7 +2138,7 @@
           <a:bodyPr/>
           <a:lstStyle/>
           <a:p>
-            <a:endParaRPr lang="en-US"/>
+            <a:endParaRPr lang="en-US" dirty="0"/>
           </a:p>
         </p:txBody>
       </p:sp>
@@ -2161,7 +2161,7 @@
               <a:rPr lang="en-US" smtClean="0"/>
               <a:t>‹#›</a:t>
             </a:fld>
-            <a:endParaRPr lang="en-US"/>
+            <a:endParaRPr lang="en-US" dirty="0"/>
           </a:p>
         </p:txBody>
       </p:sp>
@@ -2234,9 +2234,9 @@
           <a:p>
             <a:fld id="{78C97017-6FC3-485B-9764-EAC9E56C1D49}" type="datetimeFigureOut">
               <a:rPr lang="en-US" smtClean="0"/>
-              <a:t>12/5/2018</a:t>
+              <a:t>4/14/2019</a:t>
             </a:fld>
-            <a:endParaRPr lang="en-US"/>
+            <a:endParaRPr lang="en-US" dirty="0"/>
           </a:p>
         </p:txBody>
       </p:sp>
@@ -2255,7 +2255,7 @@
           <a:bodyPr/>
           <a:lstStyle/>
           <a:p>
-            <a:endParaRPr lang="en-US"/>
+            <a:endParaRPr lang="en-US" dirty="0"/>
           </a:p>
         </p:txBody>
       </p:sp>
@@ -2278,7 +2278,7 @@
               <a:rPr lang="en-US" smtClean="0"/>
               <a:t>‹#›</a:t>
             </a:fld>
-            <a:endParaRPr lang="en-US"/>
+            <a:endParaRPr lang="en-US" dirty="0"/>
           </a:p>
         </p:txBody>
       </p:sp>
@@ -2329,9 +2329,9 @@
           <a:p>
             <a:fld id="{78C97017-6FC3-485B-9764-EAC9E56C1D49}" type="datetimeFigureOut">
               <a:rPr lang="en-US" smtClean="0"/>
-              <a:t>12/5/2018</a:t>
+              <a:t>4/14/2019</a:t>
             </a:fld>
-            <a:endParaRPr lang="en-US"/>
+            <a:endParaRPr lang="en-US" dirty="0"/>
           </a:p>
         </p:txBody>
       </p:sp>
@@ -2350,7 +2350,7 @@
           <a:bodyPr/>
           <a:lstStyle/>
           <a:p>
-            <a:endParaRPr lang="en-US"/>
+            <a:endParaRPr lang="en-US" dirty="0"/>
           </a:p>
         </p:txBody>
       </p:sp>
@@ -2373,7 +2373,7 @@
               <a:rPr lang="en-US" smtClean="0"/>
               <a:t>‹#›</a:t>
             </a:fld>
-            <a:endParaRPr lang="en-US"/>
+            <a:endParaRPr lang="en-US" dirty="0"/>
           </a:p>
         </p:txBody>
       </p:sp>
@@ -2604,9 +2604,9 @@
           <a:p>
             <a:fld id="{78C97017-6FC3-485B-9764-EAC9E56C1D49}" type="datetimeFigureOut">
               <a:rPr lang="en-US" smtClean="0"/>
-              <a:t>12/5/2018</a:t>
+              <a:t>4/14/2019</a:t>
             </a:fld>
-            <a:endParaRPr lang="en-US"/>
+            <a:endParaRPr lang="en-US" dirty="0"/>
           </a:p>
         </p:txBody>
       </p:sp>
@@ -2625,7 +2625,7 @@
           <a:bodyPr/>
           <a:lstStyle/>
           <a:p>
-            <a:endParaRPr lang="en-US"/>
+            <a:endParaRPr lang="en-US" dirty="0"/>
           </a:p>
         </p:txBody>
       </p:sp>
@@ -2648,7 +2648,7 @@
               <a:rPr lang="en-US" smtClean="0"/>
               <a:t>‹#›</a:t>
             </a:fld>
-            <a:endParaRPr lang="en-US"/>
+            <a:endParaRPr lang="en-US" dirty="0"/>
           </a:p>
         </p:txBody>
       </p:sp>
@@ -2770,7 +2770,7 @@
             </a:lvl9pPr>
           </a:lstStyle>
           <a:p>
-            <a:endParaRPr lang="en-US"/>
+            <a:endParaRPr lang="en-US" dirty="0"/>
           </a:p>
         </p:txBody>
       </p:sp>
@@ -2856,9 +2856,9 @@
           <a:p>
             <a:fld id="{78C97017-6FC3-485B-9764-EAC9E56C1D49}" type="datetimeFigureOut">
               <a:rPr lang="en-US" smtClean="0"/>
-              <a:t>12/5/2018</a:t>
+              <a:t>4/14/2019</a:t>
             </a:fld>
-            <a:endParaRPr lang="en-US"/>
+            <a:endParaRPr lang="en-US" dirty="0"/>
           </a:p>
         </p:txBody>
       </p:sp>
@@ -2877,7 +2877,7 @@
           <a:bodyPr/>
           <a:lstStyle/>
           <a:p>
-            <a:endParaRPr lang="en-US"/>
+            <a:endParaRPr lang="en-US" dirty="0"/>
           </a:p>
         </p:txBody>
       </p:sp>
@@ -2900,7 +2900,7 @@
               <a:rPr lang="en-US" smtClean="0"/>
               <a:t>‹#›</a:t>
             </a:fld>
-            <a:endParaRPr lang="en-US"/>
+            <a:endParaRPr lang="en-US" dirty="0"/>
           </a:p>
         </p:txBody>
       </p:sp>
@@ -3067,9 +3067,9 @@
           <a:p>
             <a:fld id="{78C97017-6FC3-485B-9764-EAC9E56C1D49}" type="datetimeFigureOut">
               <a:rPr lang="en-US" smtClean="0"/>
-              <a:t>12/5/2018</a:t>
+              <a:t>4/14/2019</a:t>
             </a:fld>
-            <a:endParaRPr lang="en-US"/>
+            <a:endParaRPr lang="en-US" dirty="0"/>
           </a:p>
         </p:txBody>
       </p:sp>
@@ -3106,7 +3106,7 @@
             </a:lvl1pPr>
           </a:lstStyle>
           <a:p>
-            <a:endParaRPr lang="en-US"/>
+            <a:endParaRPr lang="en-US" dirty="0"/>
           </a:p>
         </p:txBody>
       </p:sp>
@@ -3147,7 +3147,7 @@
               <a:rPr lang="en-US" smtClean="0"/>
               <a:t>‹#›</a:t>
             </a:fld>
-            <a:endParaRPr lang="en-US"/>
+            <a:endParaRPr lang="en-US" dirty="0"/>
           </a:p>
         </p:txBody>
       </p:sp>
@@ -3483,12 +3483,12 @@
           <a:p>
             <a:pPr algn="ctr"/>
             <a:r>
-              <a:rPr lang="en-US" sz="1050" dirty="0" err="1">
+              <a:rPr lang="en-US" sz="1050" dirty="0">
                 <a:solidFill>
                   <a:srgbClr val="7030A0"/>
                 </a:solidFill>
               </a:rPr>
-              <a:t>VersionedAddressBook</a:t>
+              <a:t>VersionedEPiggy</a:t>
             </a:r>
             <a:endParaRPr lang="en-SG" sz="1050" dirty="0">
               <a:solidFill>
@@ -3539,12 +3539,12 @@
           <a:p>
             <a:pPr algn="ctr"/>
             <a:r>
-              <a:rPr lang="en-US" sz="1050" dirty="0" err="1">
+              <a:rPr lang="en-US" sz="1050" dirty="0">
                 <a:solidFill>
                   <a:srgbClr val="7030A0"/>
                 </a:solidFill>
               </a:rPr>
-              <a:t>UniquePersonList</a:t>
+              <a:t>ExpenseList</a:t>
             </a:r>
             <a:endParaRPr lang="en-SG" sz="1050" dirty="0">
               <a:solidFill>
@@ -3597,7 +3597,7 @@
           <a:lstStyle/>
           <a:p>
             <a:pPr algn="ctr"/>
-            <a:endParaRPr lang="en-US" sz="1050"/>
+            <a:endParaRPr lang="en-US" sz="1050" dirty="0"/>
           </a:p>
         </p:txBody>
       </p:sp>
@@ -3688,7 +3688,7 @@
                   <a:srgbClr val="7030A0"/>
                 </a:solidFill>
               </a:rPr>
-              <a:t>Person</a:t>
+              <a:t>Expense</a:t>
             </a:r>
             <a:endParaRPr lang="en-SG" sz="1050" dirty="0">
               <a:solidFill>
@@ -3739,7 +3739,7 @@
           <a:lstStyle/>
           <a:p>
             <a:pPr algn="ctr"/>
-            <a:endParaRPr lang="en-US" sz="1050"/>
+            <a:endParaRPr lang="en-US" sz="1050" dirty="0"/>
           </a:p>
         </p:txBody>
       </p:sp>
@@ -3793,7 +3793,7 @@
         </p:nvSpPr>
         <p:spPr>
           <a:xfrm>
-            <a:off x="6680903" y="3053948"/>
+            <a:off x="5326048" y="2714218"/>
             <a:ext cx="708186" cy="285783"/>
           </a:xfrm>
           <a:prstGeom prst="rect">
@@ -3831,7 +3831,7 @@
                   <a:srgbClr val="7030A0"/>
                 </a:solidFill>
               </a:rPr>
-              <a:t>Name</a:t>
+              <a:t>Item</a:t>
             </a:r>
             <a:endParaRPr lang="en-SG" sz="1050" dirty="0">
               <a:solidFill>
@@ -3884,22 +3884,79 @@
           <a:lstStyle/>
           <a:p>
             <a:pPr algn="ctr"/>
-            <a:endParaRPr lang="en-US" sz="1050"/>
+            <a:endParaRPr lang="en-US" sz="1050" dirty="0"/>
+          </a:p>
+        </p:txBody>
+      </p:sp>
+      <p:sp>
+        <p:nvSpPr>
+          <p:cNvPr id="80" name="Rectangle 8"/>
+          <p:cNvSpPr/>
+          <p:nvPr/>
+        </p:nvSpPr>
+        <p:spPr>
+          <a:xfrm>
+            <a:off x="6680903" y="3662708"/>
+            <a:ext cx="708186" cy="285783"/>
+          </a:xfrm>
+          <a:prstGeom prst="rect">
+            <a:avLst/>
+          </a:prstGeom>
+          <a:ln w="19050">
+            <a:solidFill>
+              <a:srgbClr val="7030A0"/>
+            </a:solidFill>
+          </a:ln>
+          <a:effectLst/>
+        </p:spPr>
+        <p:style>
+          <a:lnRef idx="1">
+            <a:schemeClr val="accent4"/>
+          </a:lnRef>
+          <a:fillRef idx="2">
+            <a:schemeClr val="accent4"/>
+          </a:fillRef>
+          <a:effectRef idx="1">
+            <a:schemeClr val="accent4"/>
+          </a:effectRef>
+          <a:fontRef idx="minor">
+            <a:schemeClr val="dk1"/>
+          </a:fontRef>
+        </p:style>
+        <p:txBody>
+          <a:bodyPr rtlCol="0" anchor="ctr"/>
+          <a:lstStyle/>
+          <a:p>
+            <a:pPr algn="ctr"/>
+            <a:r>
+              <a:rPr lang="en-US" sz="1050" dirty="0">
+                <a:solidFill>
+                  <a:srgbClr val="7030A0"/>
+                </a:solidFill>
+              </a:rPr>
+              <a:t>Date</a:t>
+            </a:r>
+            <a:endParaRPr lang="en-SG" sz="1050" dirty="0">
+              <a:solidFill>
+                <a:srgbClr val="7030A0"/>
+              </a:solidFill>
+            </a:endParaRPr>
           </a:p>
         </p:txBody>
       </p:sp>
       <p:cxnSp>
         <p:nvCxnSpPr>
-          <p:cNvPr id="79" name="Elbow Connector 78"/>
+          <p:cNvPr id="81" name="Elbow Connector 80"/>
           <p:cNvCxnSpPr>
-            <a:cxnSpLocks/>
+            <a:stCxn id="78" idx="3"/>
+            <a:endCxn id="80" idx="1"/>
           </p:cNvCxnSpPr>
           <p:nvPr/>
         </p:nvCxnSpPr>
         <p:spPr>
-          <a:xfrm flipV="1">
-            <a:off x="6246501" y="3196531"/>
-            <a:ext cx="434402" cy="327761"/>
+          <a:xfrm>
+            <a:off x="6246501" y="3524601"/>
+            <a:ext cx="434402" cy="280999"/>
           </a:xfrm>
           <a:prstGeom prst="bentConnector3">
             <a:avLst/>
@@ -3930,13 +3987,13 @@
       </p:cxnSp>
       <p:sp>
         <p:nvSpPr>
-          <p:cNvPr id="80" name="Rectangle 8"/>
+          <p:cNvPr id="83" name="Rectangle 8"/>
           <p:cNvSpPr/>
           <p:nvPr/>
         </p:nvSpPr>
         <p:spPr>
           <a:xfrm>
-            <a:off x="6680903" y="3376926"/>
+            <a:off x="6680314" y="2388001"/>
             <a:ext cx="708186" cy="285783"/>
           </a:xfrm>
           <a:prstGeom prst="rect">
@@ -3974,7 +4031,7 @@
                   <a:srgbClr val="7030A0"/>
                 </a:solidFill>
               </a:rPr>
-              <a:t>Phone</a:t>
+              <a:t>Name</a:t>
             </a:r>
             <a:endParaRPr lang="en-SG" sz="1050" dirty="0">
               <a:solidFill>
@@ -3986,17 +4043,16 @@
       </p:sp>
       <p:cxnSp>
         <p:nvCxnSpPr>
-          <p:cNvPr id="81" name="Elbow Connector 80"/>
+          <p:cNvPr id="84" name="Elbow Connector 83"/>
           <p:cNvCxnSpPr>
-            <a:stCxn id="78" idx="3"/>
-            <a:endCxn id="80" idx="1"/>
+            <a:cxnSpLocks/>
           </p:cNvCxnSpPr>
           <p:nvPr/>
         </p:nvCxnSpPr>
         <p:spPr>
           <a:xfrm flipV="1">
-            <a:off x="6246501" y="3519818"/>
-            <a:ext cx="434402" cy="4783"/>
+            <a:off x="6292601" y="2872460"/>
+            <a:ext cx="386786" cy="4428"/>
           </a:xfrm>
           <a:prstGeom prst="bentConnector3">
             <a:avLst/>
@@ -4027,13 +4083,13 @@
       </p:cxnSp>
       <p:sp>
         <p:nvSpPr>
-          <p:cNvPr id="83" name="Rectangle 8"/>
+          <p:cNvPr id="85" name="Rectangle 8"/>
           <p:cNvSpPr/>
           <p:nvPr/>
         </p:nvSpPr>
         <p:spPr>
           <a:xfrm>
-            <a:off x="6680903" y="3699904"/>
+            <a:off x="6680314" y="2754653"/>
             <a:ext cx="708186" cy="285783"/>
           </a:xfrm>
           <a:prstGeom prst="rect">
@@ -4071,7 +4127,7 @@
                   <a:srgbClr val="7030A0"/>
                 </a:solidFill>
               </a:rPr>
-              <a:t>Email</a:t>
+              <a:t>Cost</a:t>
             </a:r>
             <a:endParaRPr lang="en-SG" sz="1050" dirty="0">
               <a:solidFill>
@@ -4083,17 +4139,16 @@
       </p:sp>
       <p:cxnSp>
         <p:nvCxnSpPr>
-          <p:cNvPr id="84" name="Elbow Connector 83"/>
+          <p:cNvPr id="86" name="Elbow Connector 85"/>
           <p:cNvCxnSpPr>
-            <a:stCxn id="78" idx="3"/>
-            <a:endCxn id="83" idx="1"/>
+            <a:cxnSpLocks/>
           </p:cNvCxnSpPr>
           <p:nvPr/>
         </p:nvCxnSpPr>
         <p:spPr>
           <a:xfrm>
-            <a:off x="6246501" y="3524601"/>
-            <a:ext cx="434402" cy="318195"/>
+            <a:off x="6245912" y="2879459"/>
+            <a:ext cx="439925" cy="319551"/>
           </a:xfrm>
           <a:prstGeom prst="bentConnector3">
             <a:avLst/>
@@ -4124,14 +4179,98 @@
       </p:cxnSp>
       <p:sp>
         <p:nvSpPr>
-          <p:cNvPr id="85" name="Rectangle 8"/>
+          <p:cNvPr id="54" name="TextBox 53"/>
+          <p:cNvSpPr txBox="1"/>
+          <p:nvPr/>
+        </p:nvSpPr>
+        <p:spPr>
+          <a:xfrm>
+            <a:off x="3293478" y="3548574"/>
+            <a:ext cx="189257" cy="178683"/>
+          </a:xfrm>
+          <a:prstGeom prst="rect">
+            <a:avLst/>
+          </a:prstGeom>
+          <a:noFill/>
+        </p:spPr>
+        <p:txBody>
+          <a:bodyPr wrap="square" lIns="0" tIns="0" rIns="0" bIns="0" rtlCol="0">
+            <a:noAutofit/>
+          </a:bodyPr>
+          <a:lstStyle/>
+          <a:p>
+            <a:pPr algn="ctr"/>
+            <a:r>
+              <a:rPr lang="en-US" sz="1100" dirty="0">
+                <a:solidFill>
+                  <a:srgbClr val="7030A0"/>
+                </a:solidFill>
+              </a:rPr>
+              <a:t>1</a:t>
+            </a:r>
+            <a:endParaRPr lang="en-SG" sz="1100" dirty="0">
+              <a:solidFill>
+                <a:srgbClr val="7030A0"/>
+              </a:solidFill>
+            </a:endParaRPr>
+          </a:p>
+        </p:txBody>
+      </p:sp>
+      <p:sp>
+        <p:nvSpPr>
+          <p:cNvPr id="61" name="TextBox 60"/>
+          <p:cNvSpPr txBox="1"/>
+          <p:nvPr/>
+        </p:nvSpPr>
+        <p:spPr>
+          <a:xfrm>
+            <a:off x="5129013" y="3014750"/>
+            <a:ext cx="189257" cy="178683"/>
+          </a:xfrm>
+          <a:prstGeom prst="rect">
+            <a:avLst/>
+          </a:prstGeom>
+          <a:noFill/>
+        </p:spPr>
+        <p:txBody>
+          <a:bodyPr wrap="square" lIns="0" tIns="0" rIns="0" bIns="0" rtlCol="0">
+            <a:noAutofit/>
+          </a:bodyPr>
+          <a:lstStyle/>
+          <a:p>
+            <a:pPr algn="ctr"/>
+            <a:r>
+              <a:rPr lang="en-US" sz="1100" dirty="0">
+                <a:solidFill>
+                  <a:srgbClr val="7030A0"/>
+                </a:solidFill>
+              </a:rPr>
+              <a:t>*</a:t>
+            </a:r>
+            <a:endParaRPr lang="en-SG" sz="1100" dirty="0">
+              <a:solidFill>
+                <a:srgbClr val="7030A0"/>
+              </a:solidFill>
+            </a:endParaRPr>
+          </a:p>
+        </p:txBody>
+      </p:sp>
+      <p:sp>
+        <p:nvSpPr>
+          <p:cNvPr id="52" name="Rectangle 8">
+            <a:extLst>
+              <a:ext uri="{FF2B5EF4-FFF2-40B4-BE49-F238E27FC236}">
+                <a16:creationId xmlns:a16="http://schemas.microsoft.com/office/drawing/2014/main" id="{ABDCDBD2-131A-4B66-A2F2-43BBEE82C773}"/>
+              </a:ext>
+            </a:extLst>
+          </p:cNvPr>
           <p:cNvSpPr/>
           <p:nvPr/>
         </p:nvSpPr>
         <p:spPr>
           <a:xfrm>
-            <a:off x="6680903" y="4022881"/>
-            <a:ext cx="708186" cy="285783"/>
+            <a:off x="3739427" y="2286000"/>
+            <a:ext cx="1156969" cy="285783"/>
           </a:xfrm>
           <a:prstGeom prst="rect">
             <a:avLst/>
@@ -4168,189 +4307,18 @@
                   <a:srgbClr val="7030A0"/>
                 </a:solidFill>
               </a:rPr>
-              <a:t>Address</a:t>
-            </a:r>
-            <a:endParaRPr lang="en-SG" sz="1050" dirty="0">
-              <a:solidFill>
-                <a:srgbClr val="7030A0"/>
-              </a:solidFill>
-            </a:endParaRPr>
-          </a:p>
-        </p:txBody>
-      </p:sp>
-      <p:cxnSp>
-        <p:nvCxnSpPr>
-          <p:cNvPr id="86" name="Elbow Connector 85"/>
-          <p:cNvCxnSpPr>
-            <a:cxnSpLocks/>
-            <a:stCxn id="78" idx="3"/>
-            <a:endCxn id="85" idx="1"/>
-          </p:cNvCxnSpPr>
-          <p:nvPr/>
-        </p:nvCxnSpPr>
-        <p:spPr>
-          <a:xfrm>
-            <a:off x="6246501" y="3524601"/>
-            <a:ext cx="434402" cy="641172"/>
-          </a:xfrm>
-          <a:prstGeom prst="bentConnector3">
-            <a:avLst/>
-          </a:prstGeom>
-          <a:ln w="19050">
-            <a:solidFill>
-              <a:srgbClr val="7030A0"/>
-            </a:solidFill>
-            <a:headEnd type="none" w="med" len="med"/>
-            <a:tailEnd type="arrow" w="med" len="med"/>
-          </a:ln>
-          <a:effectLst/>
-        </p:spPr>
-        <p:style>
-          <a:lnRef idx="1">
-            <a:schemeClr val="accent2"/>
-          </a:lnRef>
-          <a:fillRef idx="2">
-            <a:schemeClr val="accent2"/>
-          </a:fillRef>
-          <a:effectRef idx="1">
-            <a:schemeClr val="accent2"/>
-          </a:effectRef>
-          <a:fontRef idx="minor">
-            <a:schemeClr val="dk1"/>
-          </a:fontRef>
-        </p:style>
-      </p:cxnSp>
-      <p:sp>
-        <p:nvSpPr>
-          <p:cNvPr id="54" name="TextBox 53"/>
-          <p:cNvSpPr txBox="1"/>
-          <p:nvPr/>
-        </p:nvSpPr>
-        <p:spPr>
-          <a:xfrm>
-            <a:off x="3293478" y="3548574"/>
-            <a:ext cx="189257" cy="178683"/>
-          </a:xfrm>
-          <a:prstGeom prst="rect">
-            <a:avLst/>
-          </a:prstGeom>
-          <a:noFill/>
-        </p:spPr>
-        <p:txBody>
-          <a:bodyPr wrap="square" lIns="0" tIns="0" rIns="0" bIns="0" rtlCol="0">
-            <a:noAutofit/>
-          </a:bodyPr>
-          <a:lstStyle/>
+              <a:t>SimpledProperty</a:t>
+            </a:r>
+          </a:p>
           <a:p>
             <a:pPr algn="ctr"/>
             <a:r>
-              <a:rPr lang="en-US" sz="1100" dirty="0">
+              <a:rPr lang="en-US" sz="1050" dirty="0">
                 <a:solidFill>
                   <a:srgbClr val="7030A0"/>
                 </a:solidFill>
               </a:rPr>
-              <a:t>1</a:t>
-            </a:r>
-            <a:endParaRPr lang="en-SG" sz="1100" dirty="0">
-              <a:solidFill>
-                <a:srgbClr val="7030A0"/>
-              </a:solidFill>
-            </a:endParaRPr>
-          </a:p>
-        </p:txBody>
-      </p:sp>
-      <p:sp>
-        <p:nvSpPr>
-          <p:cNvPr id="61" name="TextBox 60"/>
-          <p:cNvSpPr txBox="1"/>
-          <p:nvPr/>
-        </p:nvSpPr>
-        <p:spPr>
-          <a:xfrm>
-            <a:off x="5103762" y="3587627"/>
-            <a:ext cx="189257" cy="178683"/>
-          </a:xfrm>
-          <a:prstGeom prst="rect">
-            <a:avLst/>
-          </a:prstGeom>
-          <a:noFill/>
-        </p:spPr>
-        <p:txBody>
-          <a:bodyPr wrap="square" lIns="0" tIns="0" rIns="0" bIns="0" rtlCol="0">
-            <a:noAutofit/>
-          </a:bodyPr>
-          <a:lstStyle/>
-          <a:p>
-            <a:pPr algn="ctr"/>
-            <a:r>
-              <a:rPr lang="en-US" sz="1100" dirty="0">
-                <a:solidFill>
-                  <a:srgbClr val="7030A0"/>
-                </a:solidFill>
-              </a:rPr>
-              <a:t>*</a:t>
-            </a:r>
-            <a:endParaRPr lang="en-SG" sz="1100" dirty="0">
-              <a:solidFill>
-                <a:srgbClr val="7030A0"/>
-              </a:solidFill>
-            </a:endParaRPr>
-          </a:p>
-        </p:txBody>
-      </p:sp>
-      <p:sp>
-        <p:nvSpPr>
-          <p:cNvPr id="52" name="Rectangle 8">
-            <a:extLst>
-              <a:ext uri="{FF2B5EF4-FFF2-40B4-BE49-F238E27FC236}">
-                <a16:creationId xmlns:a16="http://schemas.microsoft.com/office/drawing/2014/main" id="{ABDCDBD2-131A-4B66-A2F2-43BBEE82C773}"/>
-              </a:ext>
-            </a:extLst>
-          </p:cNvPr>
-          <p:cNvSpPr/>
-          <p:nvPr/>
-        </p:nvSpPr>
-        <p:spPr>
-          <a:xfrm>
-            <a:off x="3724378" y="2696571"/>
-            <a:ext cx="1156969" cy="285783"/>
-          </a:xfrm>
-          <a:prstGeom prst="rect">
-            <a:avLst/>
-          </a:prstGeom>
-          <a:ln w="19050">
-            <a:solidFill>
-              <a:srgbClr val="7030A0"/>
-            </a:solidFill>
-          </a:ln>
-          <a:effectLst/>
-        </p:spPr>
-        <p:style>
-          <a:lnRef idx="1">
-            <a:schemeClr val="accent4"/>
-          </a:lnRef>
-          <a:fillRef idx="2">
-            <a:schemeClr val="accent4"/>
-          </a:fillRef>
-          <a:effectRef idx="1">
-            <a:schemeClr val="accent4"/>
-          </a:effectRef>
-          <a:fontRef idx="minor">
-            <a:schemeClr val="dk1"/>
-          </a:fontRef>
-        </p:style>
-        <p:txBody>
-          <a:bodyPr rtlCol="0" anchor="ctr"/>
-          <a:lstStyle/>
-          <a:p>
-            <a:pPr algn="ctr"/>
-            <a:r>
-              <a:rPr lang="en-US" sz="1050" dirty="0" err="1">
-                <a:solidFill>
-                  <a:srgbClr val="7030A0"/>
-                </a:solidFill>
-              </a:rPr>
-              <a:t>UniqueTagList</a:t>
+              <a:t>&lt;Goal&gt;</a:t>
             </a:r>
             <a:endParaRPr lang="en-SG" sz="1050" dirty="0">
               <a:solidFill>
@@ -4378,8 +4346,8 @@
         </p:nvCxnSpPr>
         <p:spPr>
           <a:xfrm rot="5400000" flipH="1" flipV="1">
-            <a:off x="3201687" y="3025884"/>
-            <a:ext cx="709111" cy="336271"/>
+            <a:off x="3003926" y="2813073"/>
+            <a:ext cx="1119682" cy="351320"/>
           </a:xfrm>
           <a:prstGeom prst="bentConnector2">
             <a:avLst/>
@@ -4422,7 +4390,7 @@
         </p:nvSpPr>
         <p:spPr>
           <a:xfrm>
-            <a:off x="5682850" y="2920431"/>
+            <a:off x="6476034" y="3237379"/>
             <a:ext cx="189257" cy="178683"/>
           </a:xfrm>
           <a:prstGeom prst="rect">
@@ -4455,10 +4423,55 @@
       </p:sp>
       <p:sp>
         <p:nvSpPr>
-          <p:cNvPr id="55" name="Flowchart: Decision 96">
+          <p:cNvPr id="69" name="TextBox 68">
             <a:extLst>
               <a:ext uri="{FF2B5EF4-FFF2-40B4-BE49-F238E27FC236}">
-                <a16:creationId xmlns:a16="http://schemas.microsoft.com/office/drawing/2014/main" id="{B9F96195-942D-4692-91B7-CF34229E7461}"/>
+                <a16:creationId xmlns:a16="http://schemas.microsoft.com/office/drawing/2014/main" id="{8CF9406A-39C7-4163-8880-BB65541FC08E}"/>
+              </a:ext>
+            </a:extLst>
+          </p:cNvPr>
+          <p:cNvSpPr txBox="1"/>
+          <p:nvPr/>
+        </p:nvSpPr>
+        <p:spPr>
+          <a:xfrm>
+            <a:off x="3489628" y="2224035"/>
+            <a:ext cx="189257" cy="178683"/>
+          </a:xfrm>
+          <a:prstGeom prst="rect">
+            <a:avLst/>
+          </a:prstGeom>
+          <a:noFill/>
+        </p:spPr>
+        <p:txBody>
+          <a:bodyPr wrap="square" lIns="0" tIns="0" rIns="0" bIns="0" rtlCol="0">
+            <a:noAutofit/>
+          </a:bodyPr>
+          <a:lstStyle/>
+          <a:p>
+            <a:pPr algn="ctr"/>
+            <a:r>
+              <a:rPr lang="en-US" sz="1100" dirty="0">
+                <a:solidFill>
+                  <a:srgbClr val="7030A0"/>
+                </a:solidFill>
+              </a:rPr>
+              <a:t>1</a:t>
+            </a:r>
+            <a:endParaRPr lang="en-SG" sz="1100" dirty="0">
+              <a:solidFill>
+                <a:srgbClr val="7030A0"/>
+              </a:solidFill>
+            </a:endParaRPr>
+          </a:p>
+        </p:txBody>
+      </p:sp>
+      <p:sp>
+        <p:nvSpPr>
+          <p:cNvPr id="33" name="Flowchart: Decision 96">
+            <a:extLst>
+              <a:ext uri="{FF2B5EF4-FFF2-40B4-BE49-F238E27FC236}">
+                <a16:creationId xmlns:a16="http://schemas.microsoft.com/office/drawing/2014/main" id="{2FF34B92-D016-4B2D-A544-E80C5038407D}"/>
               </a:ext>
             </a:extLst>
           </p:cNvPr>
@@ -4466,14 +4479,16 @@
           <p:nvPr/>
         </p:nvSpPr>
         <p:spPr>
-          <a:xfrm rot="16200000">
-            <a:off x="5521988" y="3154431"/>
+          <a:xfrm>
+            <a:off x="6046586" y="2785770"/>
             <a:ext cx="236048" cy="173380"/>
           </a:xfrm>
           <a:prstGeom prst="flowChartDecision">
             <a:avLst/>
           </a:prstGeom>
-          <a:noFill/>
+          <a:solidFill>
+            <a:srgbClr val="7030A0"/>
+          </a:solidFill>
           <a:ln w="19050">
             <a:solidFill>
               <a:srgbClr val="7030A0"/>
@@ -4500,29 +4515,28 @@
           <a:lstStyle/>
           <a:p>
             <a:pPr algn="ctr"/>
-            <a:endParaRPr lang="en-US" sz="1050"/>
+            <a:endParaRPr lang="en-US" sz="1050" dirty="0"/>
           </a:p>
         </p:txBody>
       </p:sp>
       <p:cxnSp>
         <p:nvCxnSpPr>
-          <p:cNvPr id="59" name="Elbow Connector 63">
+          <p:cNvPr id="34" name="Elbow Connector 78">
             <a:extLst>
               <a:ext uri="{FF2B5EF4-FFF2-40B4-BE49-F238E27FC236}">
-                <a16:creationId xmlns:a16="http://schemas.microsoft.com/office/drawing/2014/main" id="{E2D6A56C-A223-4236-A1F0-7EFEBA2FC940}"/>
+                <a16:creationId xmlns:a16="http://schemas.microsoft.com/office/drawing/2014/main" id="{DDA0B42F-57B9-4920-9116-990127BDA82F}"/>
               </a:ext>
             </a:extLst>
           </p:cNvPr>
           <p:cNvCxnSpPr>
             <a:cxnSpLocks/>
-            <a:endCxn id="67" idx="1"/>
           </p:cNvCxnSpPr>
           <p:nvPr/>
         </p:nvCxnSpPr>
         <p:spPr>
           <a:xfrm flipV="1">
-            <a:off x="4852786" y="2722716"/>
-            <a:ext cx="432916" cy="111294"/>
+            <a:off x="6251435" y="2550338"/>
+            <a:ext cx="434402" cy="327761"/>
           </a:xfrm>
           <a:prstGeom prst="bentConnector3">
             <a:avLst/>
@@ -4553,10 +4567,10 @@
       </p:cxnSp>
       <p:sp>
         <p:nvSpPr>
-          <p:cNvPr id="67" name="Rectangle 8">
+          <p:cNvPr id="41" name="Rectangle 8">
             <a:extLst>
               <a:ext uri="{FF2B5EF4-FFF2-40B4-BE49-F238E27FC236}">
-                <a16:creationId xmlns:a16="http://schemas.microsoft.com/office/drawing/2014/main" id="{36D68104-33BB-4C8F-B764-F3F0B25E592B}"/>
+                <a16:creationId xmlns:a16="http://schemas.microsoft.com/office/drawing/2014/main" id="{E0E22148-A3B0-4EA4-AAAA-CF490EF7DAC7}"/>
               </a:ext>
             </a:extLst>
           </p:cNvPr>
@@ -4565,8 +4579,8 @@
         </p:nvSpPr>
         <p:spPr>
           <a:xfrm>
-            <a:off x="5285702" y="2549336"/>
-            <a:ext cx="708186" cy="346760"/>
+            <a:off x="6680314" y="3121305"/>
+            <a:ext cx="708186" cy="285783"/>
           </a:xfrm>
           <a:prstGeom prst="rect">
             <a:avLst/>
@@ -4615,10 +4629,120 @@
       </p:sp>
       <p:sp>
         <p:nvSpPr>
-          <p:cNvPr id="68" name="TextBox 67">
+          <p:cNvPr id="44" name="Rectangle 8">
             <a:extLst>
               <a:ext uri="{FF2B5EF4-FFF2-40B4-BE49-F238E27FC236}">
-                <a16:creationId xmlns:a16="http://schemas.microsoft.com/office/drawing/2014/main" id="{18A2ABF0-4DA8-43EE-BACE-A737C4E4CFEC}"/>
+                <a16:creationId xmlns:a16="http://schemas.microsoft.com/office/drawing/2014/main" id="{33DD832E-3818-4EEC-B76C-9FC603C1143B}"/>
+              </a:ext>
+            </a:extLst>
+          </p:cNvPr>
+          <p:cNvSpPr/>
+          <p:nvPr/>
+        </p:nvSpPr>
+        <p:spPr>
+          <a:xfrm>
+            <a:off x="3724377" y="3805599"/>
+            <a:ext cx="1156969" cy="346760"/>
+          </a:xfrm>
+          <a:prstGeom prst="rect">
+            <a:avLst/>
+          </a:prstGeom>
+          <a:ln w="19050">
+            <a:solidFill>
+              <a:srgbClr val="7030A0"/>
+            </a:solidFill>
+          </a:ln>
+          <a:effectLst/>
+        </p:spPr>
+        <p:style>
+          <a:lnRef idx="1">
+            <a:schemeClr val="accent4"/>
+          </a:lnRef>
+          <a:fillRef idx="2">
+            <a:schemeClr val="accent4"/>
+          </a:fillRef>
+          <a:effectRef idx="1">
+            <a:schemeClr val="accent4"/>
+          </a:effectRef>
+          <a:fontRef idx="minor">
+            <a:schemeClr val="dk1"/>
+          </a:fontRef>
+        </p:style>
+        <p:txBody>
+          <a:bodyPr rtlCol="0" anchor="ctr"/>
+          <a:lstStyle/>
+          <a:p>
+            <a:pPr algn="ctr"/>
+            <a:r>
+              <a:rPr lang="en-US" sz="1050" dirty="0">
+                <a:solidFill>
+                  <a:srgbClr val="7030A0"/>
+                </a:solidFill>
+              </a:rPr>
+              <a:t>BudgetList</a:t>
+            </a:r>
+            <a:endParaRPr lang="en-SG" sz="1050" dirty="0">
+              <a:solidFill>
+                <a:srgbClr val="7030A0"/>
+              </a:solidFill>
+            </a:endParaRPr>
+          </a:p>
+        </p:txBody>
+      </p:sp>
+      <p:cxnSp>
+        <p:nvCxnSpPr>
+          <p:cNvPr id="56" name="Elbow Connector 85">
+            <a:extLst>
+              <a:ext uri="{FF2B5EF4-FFF2-40B4-BE49-F238E27FC236}">
+                <a16:creationId xmlns:a16="http://schemas.microsoft.com/office/drawing/2014/main" id="{F612B437-B662-42FC-8A43-D6460776402C}"/>
+              </a:ext>
+            </a:extLst>
+          </p:cNvPr>
+          <p:cNvCxnSpPr>
+            <a:cxnSpLocks/>
+            <a:stCxn id="54" idx="2"/>
+            <a:endCxn id="44" idx="1"/>
+          </p:cNvCxnSpPr>
+          <p:nvPr/>
+        </p:nvCxnSpPr>
+        <p:spPr>
+          <a:xfrm rot="16200000" flipH="1">
+            <a:off x="3430381" y="3684983"/>
+            <a:ext cx="251722" cy="336270"/>
+          </a:xfrm>
+          <a:prstGeom prst="bentConnector2">
+            <a:avLst/>
+          </a:prstGeom>
+          <a:ln w="19050">
+            <a:solidFill>
+              <a:srgbClr val="7030A0"/>
+            </a:solidFill>
+            <a:headEnd type="none" w="med" len="med"/>
+            <a:tailEnd type="arrow" w="med" len="med"/>
+          </a:ln>
+          <a:effectLst/>
+        </p:spPr>
+        <p:style>
+          <a:lnRef idx="1">
+            <a:schemeClr val="accent2"/>
+          </a:lnRef>
+          <a:fillRef idx="2">
+            <a:schemeClr val="accent2"/>
+          </a:fillRef>
+          <a:effectRef idx="1">
+            <a:schemeClr val="accent2"/>
+          </a:effectRef>
+          <a:fontRef idx="minor">
+            <a:schemeClr val="dk1"/>
+          </a:fontRef>
+        </p:style>
+      </p:cxnSp>
+      <p:sp>
+        <p:nvSpPr>
+          <p:cNvPr id="58" name="TextBox 57">
+            <a:extLst>
+              <a:ext uri="{FF2B5EF4-FFF2-40B4-BE49-F238E27FC236}">
+                <a16:creationId xmlns:a16="http://schemas.microsoft.com/office/drawing/2014/main" id="{9525F43A-EBB8-4955-8393-1EE55570EFC3}"/>
               </a:ext>
             </a:extLst>
           </p:cNvPr>
@@ -4627,52 +4751,7 @@
         </p:nvSpPr>
         <p:spPr>
           <a:xfrm>
-            <a:off x="5103762" y="2767724"/>
-            <a:ext cx="189257" cy="178683"/>
-          </a:xfrm>
-          <a:prstGeom prst="rect">
-            <a:avLst/>
-          </a:prstGeom>
-          <a:noFill/>
-        </p:spPr>
-        <p:txBody>
-          <a:bodyPr wrap="square" lIns="0" tIns="0" rIns="0" bIns="0" rtlCol="0">
-            <a:noAutofit/>
-          </a:bodyPr>
-          <a:lstStyle/>
-          <a:p>
-            <a:pPr algn="ctr"/>
-            <a:r>
-              <a:rPr lang="en-US" sz="1100" dirty="0">
-                <a:solidFill>
-                  <a:srgbClr val="7030A0"/>
-                </a:solidFill>
-              </a:rPr>
-              <a:t>*</a:t>
-            </a:r>
-            <a:endParaRPr lang="en-SG" sz="1100" dirty="0">
-              <a:solidFill>
-                <a:srgbClr val="7030A0"/>
-              </a:solidFill>
-            </a:endParaRPr>
-          </a:p>
-        </p:txBody>
-      </p:sp>
-      <p:sp>
-        <p:nvSpPr>
-          <p:cNvPr id="69" name="TextBox 68">
-            <a:extLst>
-              <a:ext uri="{FF2B5EF4-FFF2-40B4-BE49-F238E27FC236}">
-                <a16:creationId xmlns:a16="http://schemas.microsoft.com/office/drawing/2014/main" id="{8CF9406A-39C7-4163-8880-BB65541FC08E}"/>
-              </a:ext>
-            </a:extLst>
-          </p:cNvPr>
-          <p:cNvSpPr txBox="1"/>
-          <p:nvPr/>
-        </p:nvSpPr>
-        <p:spPr>
-          <a:xfrm>
-            <a:off x="3335606" y="2662682"/>
+            <a:off x="3385883" y="3307903"/>
             <a:ext cx="189257" cy="178683"/>
           </a:xfrm>
           <a:prstGeom prst="rect">
@@ -4705,10 +4784,10 @@
       </p:sp>
       <p:sp>
         <p:nvSpPr>
-          <p:cNvPr id="71" name="Flowchart: Decision 96">
+          <p:cNvPr id="60" name="Rectangle 8">
             <a:extLst>
               <a:ext uri="{FF2B5EF4-FFF2-40B4-BE49-F238E27FC236}">
-                <a16:creationId xmlns:a16="http://schemas.microsoft.com/office/drawing/2014/main" id="{233007D4-EEA2-4CA6-ACFE-1517B654224E}"/>
+                <a16:creationId xmlns:a16="http://schemas.microsoft.com/office/drawing/2014/main" id="{00B2A219-009A-458A-883E-60A2994E83BA}"/>
               </a:ext>
             </a:extLst>
           </p:cNvPr>
@@ -4717,15 +4796,75 @@
         </p:nvSpPr>
         <p:spPr>
           <a:xfrm>
-            <a:off x="4879835" y="2751791"/>
+            <a:off x="5280188" y="3893480"/>
+            <a:ext cx="708186" cy="346760"/>
+          </a:xfrm>
+          <a:prstGeom prst="rect">
+            <a:avLst/>
+          </a:prstGeom>
+          <a:ln w="19050">
+            <a:solidFill>
+              <a:srgbClr val="7030A0"/>
+            </a:solidFill>
+          </a:ln>
+          <a:effectLst/>
+        </p:spPr>
+        <p:style>
+          <a:lnRef idx="1">
+            <a:schemeClr val="accent4"/>
+          </a:lnRef>
+          <a:fillRef idx="2">
+            <a:schemeClr val="accent4"/>
+          </a:fillRef>
+          <a:effectRef idx="1">
+            <a:schemeClr val="accent4"/>
+          </a:effectRef>
+          <a:fontRef idx="minor">
+            <a:schemeClr val="dk1"/>
+          </a:fontRef>
+        </p:style>
+        <p:txBody>
+          <a:bodyPr rtlCol="0" anchor="ctr"/>
+          <a:lstStyle/>
+          <a:p>
+            <a:pPr algn="ctr"/>
+            <a:r>
+              <a:rPr lang="en-US" sz="1050" dirty="0">
+                <a:solidFill>
+                  <a:srgbClr val="7030A0"/>
+                </a:solidFill>
+              </a:rPr>
+              <a:t>Budget</a:t>
+            </a:r>
+            <a:endParaRPr lang="en-SG" sz="1050" dirty="0">
+              <a:solidFill>
+                <a:srgbClr val="7030A0"/>
+              </a:solidFill>
+            </a:endParaRPr>
+          </a:p>
+        </p:txBody>
+      </p:sp>
+      <p:sp>
+        <p:nvSpPr>
+          <p:cNvPr id="65" name="Flowchart: Decision 96">
+            <a:extLst>
+              <a:ext uri="{FF2B5EF4-FFF2-40B4-BE49-F238E27FC236}">
+                <a16:creationId xmlns:a16="http://schemas.microsoft.com/office/drawing/2014/main" id="{34174906-1AE9-4EE2-934A-F19523C54871}"/>
+              </a:ext>
+            </a:extLst>
+          </p:cNvPr>
+          <p:cNvSpPr/>
+          <p:nvPr/>
+        </p:nvSpPr>
+        <p:spPr>
+          <a:xfrm>
+            <a:off x="4886966" y="3965886"/>
             <a:ext cx="236048" cy="173380"/>
           </a:xfrm>
           <a:prstGeom prst="flowChartDecision">
             <a:avLst/>
           </a:prstGeom>
-          <a:solidFill>
-            <a:srgbClr val="7030A0"/>
-          </a:solidFill>
+          <a:noFill/>
           <a:ln w="19050">
             <a:solidFill>
               <a:srgbClr val="7030A0"/>
@@ -4752,35 +4891,428 @@
           <a:lstStyle/>
           <a:p>
             <a:pPr algn="ctr"/>
-            <a:endParaRPr lang="en-US" sz="1050"/>
+            <a:endParaRPr lang="en-US" sz="1050" dirty="0"/>
           </a:p>
         </p:txBody>
       </p:sp>
       <p:cxnSp>
         <p:nvCxnSpPr>
-          <p:cNvPr id="72" name="Elbow Connector 78">
+          <p:cNvPr id="66" name="Elbow Connector 63">
             <a:extLst>
               <a:ext uri="{FF2B5EF4-FFF2-40B4-BE49-F238E27FC236}">
-                <a16:creationId xmlns:a16="http://schemas.microsoft.com/office/drawing/2014/main" id="{D5DFB8C5-B0B0-46C1-967B-4449112ABD6F}"/>
+                <a16:creationId xmlns:a16="http://schemas.microsoft.com/office/drawing/2014/main" id="{2D06E7E0-2633-4198-93A0-1509A855611A}"/>
               </a:ext>
             </a:extLst>
           </p:cNvPr>
           <p:cNvCxnSpPr>
             <a:cxnSpLocks/>
-            <a:stCxn id="55" idx="3"/>
-            <a:endCxn id="67" idx="2"/>
           </p:cNvCxnSpPr>
           <p:nvPr/>
         </p:nvCxnSpPr>
         <p:spPr>
-          <a:xfrm rot="16200000" flipV="1">
-            <a:off x="5526404" y="3009488"/>
-            <a:ext cx="227001" cy="217"/>
+          <a:xfrm>
+            <a:off x="5128634" y="4054831"/>
+            <a:ext cx="159169" cy="3691"/>
+          </a:xfrm>
+          <a:prstGeom prst="bentConnector3">
+            <a:avLst/>
+          </a:prstGeom>
+          <a:ln w="19050">
+            <a:solidFill>
+              <a:srgbClr val="7030A0"/>
+            </a:solidFill>
+            <a:headEnd type="none" w="med" len="med"/>
+            <a:tailEnd type="arrow" w="med" len="med"/>
+          </a:ln>
+          <a:effectLst/>
+        </p:spPr>
+        <p:style>
+          <a:lnRef idx="1">
+            <a:schemeClr val="accent2"/>
+          </a:lnRef>
+          <a:fillRef idx="2">
+            <a:schemeClr val="accent2"/>
+          </a:fillRef>
+          <a:effectRef idx="1">
+            <a:schemeClr val="accent2"/>
+          </a:effectRef>
+          <a:fontRef idx="minor">
+            <a:schemeClr val="dk1"/>
+          </a:fontRef>
+        </p:style>
+      </p:cxnSp>
+      <p:sp>
+        <p:nvSpPr>
+          <p:cNvPr id="70" name="TextBox 69">
+            <a:extLst>
+              <a:ext uri="{FF2B5EF4-FFF2-40B4-BE49-F238E27FC236}">
+                <a16:creationId xmlns:a16="http://schemas.microsoft.com/office/drawing/2014/main" id="{27BFE4F9-AC1F-4996-842F-F9D69E5CC0C3}"/>
+              </a:ext>
+            </a:extLst>
+          </p:cNvPr>
+          <p:cNvSpPr txBox="1"/>
+          <p:nvPr/>
+        </p:nvSpPr>
+        <p:spPr>
+          <a:xfrm>
+            <a:off x="5125044" y="4101929"/>
+            <a:ext cx="157139" cy="178683"/>
+          </a:xfrm>
+          <a:prstGeom prst="rect">
+            <a:avLst/>
+          </a:prstGeom>
+          <a:noFill/>
+        </p:spPr>
+        <p:txBody>
+          <a:bodyPr wrap="square" lIns="0" tIns="0" rIns="0" bIns="0" rtlCol="0">
+            <a:noAutofit/>
+          </a:bodyPr>
+          <a:lstStyle/>
+          <a:p>
+            <a:pPr algn="ctr"/>
+            <a:r>
+              <a:rPr lang="en-US" sz="1100" dirty="0">
+                <a:solidFill>
+                  <a:srgbClr val="7030A0"/>
+                </a:solidFill>
+              </a:rPr>
+              <a:t>*</a:t>
+            </a:r>
+            <a:endParaRPr lang="en-SG" sz="1100" dirty="0">
+              <a:solidFill>
+                <a:srgbClr val="7030A0"/>
+              </a:solidFill>
+            </a:endParaRPr>
+          </a:p>
+        </p:txBody>
+      </p:sp>
+      <p:sp>
+        <p:nvSpPr>
+          <p:cNvPr id="47" name="Rectangle 8">
+            <a:extLst>
+              <a:ext uri="{FF2B5EF4-FFF2-40B4-BE49-F238E27FC236}">
+                <a16:creationId xmlns:a16="http://schemas.microsoft.com/office/drawing/2014/main" id="{DFA3EBB9-6B70-4916-ACD9-7B291A9BB098}"/>
+              </a:ext>
+            </a:extLst>
+          </p:cNvPr>
+          <p:cNvSpPr/>
+          <p:nvPr/>
+        </p:nvSpPr>
+        <p:spPr>
+          <a:xfrm>
+            <a:off x="3732994" y="2757111"/>
+            <a:ext cx="1156969" cy="346760"/>
+          </a:xfrm>
+          <a:prstGeom prst="rect">
+            <a:avLst/>
+          </a:prstGeom>
+          <a:ln w="19050">
+            <a:solidFill>
+              <a:srgbClr val="7030A0"/>
+            </a:solidFill>
+          </a:ln>
+          <a:effectLst/>
+        </p:spPr>
+        <p:style>
+          <a:lnRef idx="1">
+            <a:schemeClr val="accent4"/>
+          </a:lnRef>
+          <a:fillRef idx="2">
+            <a:schemeClr val="accent4"/>
+          </a:fillRef>
+          <a:effectRef idx="1">
+            <a:schemeClr val="accent4"/>
+          </a:effectRef>
+          <a:fontRef idx="minor">
+            <a:schemeClr val="dk1"/>
+          </a:fontRef>
+        </p:style>
+        <p:txBody>
+          <a:bodyPr rtlCol="0" anchor="ctr"/>
+          <a:lstStyle/>
+          <a:p>
+            <a:pPr algn="ctr"/>
+            <a:r>
+              <a:rPr lang="en-US" sz="1050" dirty="0">
+                <a:solidFill>
+                  <a:srgbClr val="7030A0"/>
+                </a:solidFill>
+              </a:rPr>
+              <a:t>ItemList</a:t>
+            </a:r>
+            <a:endParaRPr lang="en-SG" sz="1050" dirty="0">
+              <a:solidFill>
+                <a:srgbClr val="7030A0"/>
+              </a:solidFill>
+            </a:endParaRPr>
+          </a:p>
+        </p:txBody>
+      </p:sp>
+      <p:sp>
+        <p:nvSpPr>
+          <p:cNvPr id="48" name="Flowchart: Decision 96">
+            <a:extLst>
+              <a:ext uri="{FF2B5EF4-FFF2-40B4-BE49-F238E27FC236}">
+                <a16:creationId xmlns:a16="http://schemas.microsoft.com/office/drawing/2014/main" id="{CB09D00A-CA7C-44F3-B21A-FB74F4CABCC0}"/>
+              </a:ext>
+            </a:extLst>
+          </p:cNvPr>
+          <p:cNvSpPr/>
+          <p:nvPr/>
+        </p:nvSpPr>
+        <p:spPr>
+          <a:xfrm>
+            <a:off x="4916194" y="2829986"/>
+            <a:ext cx="236048" cy="173380"/>
+          </a:xfrm>
+          <a:prstGeom prst="flowChartDecision">
+            <a:avLst/>
+          </a:prstGeom>
+          <a:noFill/>
+          <a:ln w="19050">
+            <a:solidFill>
+              <a:srgbClr val="7030A0"/>
+            </a:solidFill>
+          </a:ln>
+          <a:effectLst/>
+        </p:spPr>
+        <p:style>
+          <a:lnRef idx="1">
+            <a:schemeClr val="accent6"/>
+          </a:lnRef>
+          <a:fillRef idx="2">
+            <a:schemeClr val="accent6"/>
+          </a:fillRef>
+          <a:effectRef idx="1">
+            <a:schemeClr val="accent6"/>
+          </a:effectRef>
+          <a:fontRef idx="minor">
+            <a:schemeClr val="dk1"/>
+          </a:fontRef>
+        </p:style>
+        <p:txBody>
+          <a:bodyPr rtlCol="0" anchor="ctr"/>
+          <a:lstStyle/>
+          <a:p>
+            <a:pPr algn="ctr"/>
+            <a:endParaRPr lang="en-US" sz="1050" dirty="0"/>
+          </a:p>
+        </p:txBody>
+      </p:sp>
+      <p:cxnSp>
+        <p:nvCxnSpPr>
+          <p:cNvPr id="71" name="Elbow Connector 63">
+            <a:extLst>
+              <a:ext uri="{FF2B5EF4-FFF2-40B4-BE49-F238E27FC236}">
+                <a16:creationId xmlns:a16="http://schemas.microsoft.com/office/drawing/2014/main" id="{662D39CA-8FFD-4DF6-BE4C-CA1F0CCD4C13}"/>
+              </a:ext>
+            </a:extLst>
+          </p:cNvPr>
+          <p:cNvCxnSpPr>
+            <a:cxnSpLocks/>
+          </p:cNvCxnSpPr>
+          <p:nvPr/>
+        </p:nvCxnSpPr>
+        <p:spPr>
+          <a:xfrm flipV="1">
+            <a:off x="5162098" y="2918170"/>
+            <a:ext cx="157096" cy="5946"/>
           </a:xfrm>
           <a:prstGeom prst="bentConnector3">
             <a:avLst>
               <a:gd name="adj1" fmla="val 50000"/>
             </a:avLst>
+          </a:prstGeom>
+          <a:ln w="19050">
+            <a:solidFill>
+              <a:srgbClr val="7030A0"/>
+            </a:solidFill>
+            <a:headEnd type="none" w="med" len="med"/>
+            <a:tailEnd type="arrow" w="med" len="med"/>
+          </a:ln>
+          <a:effectLst/>
+        </p:spPr>
+        <p:style>
+          <a:lnRef idx="1">
+            <a:schemeClr val="accent2"/>
+          </a:lnRef>
+          <a:fillRef idx="2">
+            <a:schemeClr val="accent2"/>
+          </a:fillRef>
+          <a:effectRef idx="1">
+            <a:schemeClr val="accent2"/>
+          </a:effectRef>
+          <a:fontRef idx="minor">
+            <a:schemeClr val="dk1"/>
+          </a:fontRef>
+        </p:style>
+      </p:cxnSp>
+      <p:cxnSp>
+        <p:nvCxnSpPr>
+          <p:cNvPr id="88" name="Elbow Connector 78">
+            <a:extLst>
+              <a:ext uri="{FF2B5EF4-FFF2-40B4-BE49-F238E27FC236}">
+                <a16:creationId xmlns:a16="http://schemas.microsoft.com/office/drawing/2014/main" id="{EA96C5F8-AB13-46AF-9E9E-5B790E7A6E2E}"/>
+              </a:ext>
+            </a:extLst>
+          </p:cNvPr>
+          <p:cNvCxnSpPr>
+            <a:cxnSpLocks/>
+            <a:endCxn id="47" idx="1"/>
+          </p:cNvCxnSpPr>
+          <p:nvPr/>
+        </p:nvCxnSpPr>
+        <p:spPr>
+          <a:xfrm flipV="1">
+            <a:off x="3409256" y="2930491"/>
+            <a:ext cx="323738" cy="1"/>
+          </a:xfrm>
+          <a:prstGeom prst="bentConnector3">
+            <a:avLst>
+              <a:gd name="adj1" fmla="val 50000"/>
+            </a:avLst>
+          </a:prstGeom>
+          <a:ln w="19050">
+            <a:solidFill>
+              <a:srgbClr val="7030A0"/>
+            </a:solidFill>
+            <a:headEnd type="none" w="med" len="med"/>
+            <a:tailEnd type="arrow" w="med" len="med"/>
+          </a:ln>
+          <a:effectLst/>
+        </p:spPr>
+        <p:style>
+          <a:lnRef idx="1">
+            <a:schemeClr val="accent2"/>
+          </a:lnRef>
+          <a:fillRef idx="2">
+            <a:schemeClr val="accent2"/>
+          </a:fillRef>
+          <a:effectRef idx="1">
+            <a:schemeClr val="accent2"/>
+          </a:effectRef>
+          <a:fontRef idx="minor">
+            <a:schemeClr val="dk1"/>
+          </a:fontRef>
+        </p:style>
+      </p:cxnSp>
+      <p:sp>
+        <p:nvSpPr>
+          <p:cNvPr id="89" name="TextBox 88">
+            <a:extLst>
+              <a:ext uri="{FF2B5EF4-FFF2-40B4-BE49-F238E27FC236}">
+                <a16:creationId xmlns:a16="http://schemas.microsoft.com/office/drawing/2014/main" id="{5B630282-4D7B-4ACA-A2E6-57E70B923750}"/>
+              </a:ext>
+            </a:extLst>
+          </p:cNvPr>
+          <p:cNvSpPr txBox="1"/>
+          <p:nvPr/>
+        </p:nvSpPr>
+        <p:spPr>
+          <a:xfrm>
+            <a:off x="3489627" y="2713793"/>
+            <a:ext cx="189257" cy="178683"/>
+          </a:xfrm>
+          <a:prstGeom prst="rect">
+            <a:avLst/>
+          </a:prstGeom>
+          <a:noFill/>
+        </p:spPr>
+        <p:txBody>
+          <a:bodyPr wrap="square" lIns="0" tIns="0" rIns="0" bIns="0" rtlCol="0">
+            <a:noAutofit/>
+          </a:bodyPr>
+          <a:lstStyle/>
+          <a:p>
+            <a:pPr algn="ctr"/>
+            <a:r>
+              <a:rPr lang="en-US" sz="1100" dirty="0">
+                <a:solidFill>
+                  <a:srgbClr val="7030A0"/>
+                </a:solidFill>
+              </a:rPr>
+              <a:t>1</a:t>
+            </a:r>
+            <a:endParaRPr lang="en-SG" sz="1100" dirty="0">
+              <a:solidFill>
+                <a:srgbClr val="7030A0"/>
+              </a:solidFill>
+            </a:endParaRPr>
+          </a:p>
+        </p:txBody>
+      </p:sp>
+      <p:sp>
+        <p:nvSpPr>
+          <p:cNvPr id="92" name="Flowchart: Decision 96">
+            <a:extLst>
+              <a:ext uri="{FF2B5EF4-FFF2-40B4-BE49-F238E27FC236}">
+                <a16:creationId xmlns:a16="http://schemas.microsoft.com/office/drawing/2014/main" id="{C9BD76F0-8562-46FE-92F6-9D54098A1624}"/>
+              </a:ext>
+            </a:extLst>
+          </p:cNvPr>
+          <p:cNvSpPr/>
+          <p:nvPr/>
+        </p:nvSpPr>
+        <p:spPr>
+          <a:xfrm>
+            <a:off x="5516257" y="3174396"/>
+            <a:ext cx="236048" cy="173380"/>
+          </a:xfrm>
+          <a:prstGeom prst="flowChartDecision">
+            <a:avLst/>
+          </a:prstGeom>
+          <a:noFill/>
+          <a:ln w="19050">
+            <a:solidFill>
+              <a:srgbClr val="7030A0"/>
+            </a:solidFill>
+          </a:ln>
+          <a:effectLst/>
+        </p:spPr>
+        <p:style>
+          <a:lnRef idx="1">
+            <a:schemeClr val="accent6"/>
+          </a:lnRef>
+          <a:fillRef idx="2">
+            <a:schemeClr val="accent6"/>
+          </a:fillRef>
+          <a:effectRef idx="1">
+            <a:schemeClr val="accent6"/>
+          </a:effectRef>
+          <a:fontRef idx="minor">
+            <a:schemeClr val="dk1"/>
+          </a:fontRef>
+        </p:style>
+        <p:txBody>
+          <a:bodyPr rtlCol="0" anchor="ctr"/>
+          <a:lstStyle/>
+          <a:p>
+            <a:pPr algn="ctr"/>
+            <a:endParaRPr lang="en-US" sz="1050" dirty="0"/>
+          </a:p>
+        </p:txBody>
+      </p:sp>
+      <p:cxnSp>
+        <p:nvCxnSpPr>
+          <p:cNvPr id="93" name="Elbow Connector 78">
+            <a:extLst>
+              <a:ext uri="{FF2B5EF4-FFF2-40B4-BE49-F238E27FC236}">
+                <a16:creationId xmlns:a16="http://schemas.microsoft.com/office/drawing/2014/main" id="{38701A56-5202-4EC9-A669-D6060DE92838}"/>
+              </a:ext>
+            </a:extLst>
+          </p:cNvPr>
+          <p:cNvCxnSpPr>
+            <a:cxnSpLocks/>
+          </p:cNvCxnSpPr>
+          <p:nvPr/>
+        </p:nvCxnSpPr>
+        <p:spPr>
+          <a:xfrm rot="5400000" flipH="1" flipV="1">
+            <a:off x="5560565" y="3060097"/>
+            <a:ext cx="261087" cy="49683"/>
+          </a:xfrm>
+          <a:prstGeom prst="bentConnector3">
+            <a:avLst/>
           </a:prstGeom>
           <a:ln w="19050">
             <a:solidFill>

</xml_diff>